<commit_message>
Updated Presentation and Code
</commit_message>
<xml_diff>
--- a/PPT_Files/TS_Cameron_Updates.pptx
+++ b/PPT_Files/TS_Cameron_Updates.pptx
@@ -11,7 +11,15 @@
     <p:sldId id="259" r:id="rId5"/>
     <p:sldId id="260" r:id="rId6"/>
     <p:sldId id="261" r:id="rId7"/>
-    <p:sldId id="262" r:id="rId8"/>
+    <p:sldId id="270" r:id="rId8"/>
+    <p:sldId id="269" r:id="rId9"/>
+    <p:sldId id="263" r:id="rId10"/>
+    <p:sldId id="265" r:id="rId11"/>
+    <p:sldId id="266" r:id="rId12"/>
+    <p:sldId id="267" r:id="rId13"/>
+    <p:sldId id="264" r:id="rId14"/>
+    <p:sldId id="262" r:id="rId15"/>
+    <p:sldId id="268" r:id="rId16"/>
   </p:sldIdLst>
   <p:sldSz cx="12192000" cy="6858000"/>
   <p:notesSz cx="6858000" cy="9144000"/>
@@ -658,7 +666,7 @@
           <a:p>
             <a:fld id="{9E016143-E03C-4CFD-AFDC-14E5BDEA754C}" type="datetimeFigureOut">
               <a:rPr lang="en-US" dirty="0"/>
-              <a:t>11/10/2021</a:t>
+              <a:t>11/12/21</a:t>
             </a:fld>
             <a:endParaRPr lang="en-US" dirty="0"/>
           </a:p>
@@ -882,7 +890,7 @@
           <a:p>
             <a:fld id="{C033E54A-A8CA-48C1-9504-691B58049D29}" type="datetimeFigureOut">
               <a:rPr lang="en-US" dirty="0"/>
-              <a:t>11/10/2021</a:t>
+              <a:t>11/12/21</a:t>
             </a:fld>
             <a:endParaRPr lang="en-US" dirty="0"/>
           </a:p>
@@ -1057,7 +1065,7 @@
           <a:p>
             <a:fld id="{B5F6C806-BBF7-471C-9527-881CE2266695}" type="datetimeFigureOut">
               <a:rPr lang="en-US" dirty="0"/>
-              <a:t>11/10/2021</a:t>
+              <a:t>11/12/21</a:t>
             </a:fld>
             <a:endParaRPr lang="en-US" dirty="0"/>
           </a:p>
@@ -1222,7 +1230,7 @@
           <a:p>
             <a:fld id="{78C94063-DF36-4330-A365-08DA1FA5B7D6}" type="datetimeFigureOut">
               <a:rPr lang="en-US" dirty="0"/>
-              <a:t>11/10/2021</a:t>
+              <a:t>11/12/21</a:t>
             </a:fld>
             <a:endParaRPr lang="en-US" dirty="0"/>
           </a:p>
@@ -1471,7 +1479,7 @@
           <a:p>
             <a:fld id="{908A7C6C-0F39-4D70-8E8D-FE5B9C95FA73}" type="datetimeFigureOut">
               <a:rPr lang="en-US" dirty="0"/>
-              <a:t>11/10/2021</a:t>
+              <a:t>11/12/21</a:t>
             </a:fld>
             <a:endParaRPr lang="en-US" dirty="0"/>
           </a:p>
@@ -1792,7 +1800,7 @@
           <a:p>
             <a:fld id="{DFCFA4AC-08CC-42CE-BD01-C191750A04EC}" type="datetimeFigureOut">
               <a:rPr lang="en-US" dirty="0"/>
-              <a:t>11/10/2021</a:t>
+              <a:t>11/12/21</a:t>
             </a:fld>
             <a:endParaRPr lang="en-US" dirty="0"/>
           </a:p>
@@ -2238,7 +2246,7 @@
           <a:p>
             <a:fld id="{1BA7A723-92A7-435B-B681-F25B092FEFEB}" type="datetimeFigureOut">
               <a:rPr lang="en-US" dirty="0"/>
-              <a:t>11/10/2021</a:t>
+              <a:t>11/12/21</a:t>
             </a:fld>
             <a:endParaRPr lang="en-US" dirty="0"/>
           </a:p>
@@ -2351,7 +2359,7 @@
           <a:p>
             <a:fld id="{4F170639-886C-4FCF-9EAB-ABB5DA3F3F4A}" type="datetimeFigureOut">
               <a:rPr lang="en-US" dirty="0"/>
-              <a:t>11/10/2021</a:t>
+              <a:t>11/12/21</a:t>
             </a:fld>
             <a:endParaRPr lang="en-US" dirty="0"/>
           </a:p>
@@ -2441,7 +2449,7 @@
           <a:p>
             <a:fld id="{22230651-31F4-45D2-98AE-A2108F41BC07}" type="datetimeFigureOut">
               <a:rPr lang="en-US" dirty="0"/>
-              <a:t>11/10/2021</a:t>
+              <a:t>11/12/21</a:t>
             </a:fld>
             <a:endParaRPr lang="en-US" dirty="0"/>
           </a:p>
@@ -2723,7 +2731,7 @@
           <a:p>
             <a:fld id="{6F53789A-C914-4DB1-8815-80B5EC7335C5}" type="datetimeFigureOut">
               <a:rPr lang="en-US" dirty="0"/>
-              <a:t>11/10/2021</a:t>
+              <a:t>11/12/21</a:t>
             </a:fld>
             <a:endParaRPr lang="en-US" dirty="0"/>
           </a:p>
@@ -3040,7 +3048,7 @@
           <a:p>
             <a:fld id="{5E6440AA-91A0-436F-8FDB-C0F939DCAE21}" type="datetimeFigureOut">
               <a:rPr lang="en-US" dirty="0"/>
-              <a:t>11/10/2021</a:t>
+              <a:t>11/12/21</a:t>
             </a:fld>
             <a:endParaRPr lang="en-US" dirty="0"/>
           </a:p>
@@ -3289,7 +3297,7 @@
           <a:p>
             <a:fld id="{0E59FD0C-5451-4CA0-86AF-E70AE3279989}" type="datetimeFigureOut">
               <a:rPr lang="en-US" dirty="0"/>
-              <a:t>11/10/2021</a:t>
+              <a:t>11/12/21</a:t>
             </a:fld>
             <a:endParaRPr lang="en-US" dirty="0"/>
           </a:p>
@@ -3758,6 +3766,94 @@
 </file>
 
 <file path=ppt/slides/slide1.xml><?xml version="1.0" encoding="utf-8"?>
+<p:sld xmlns:a="http://schemas.openxmlformats.org/drawingml/2006/main" xmlns:r="http://schemas.openxmlformats.org/officeDocument/2006/relationships" xmlns:p="http://schemas.openxmlformats.org/presentationml/2006/main" show="0">
+  <p:cSld>
+    <p:spTree>
+      <p:nvGrpSpPr>
+        <p:cNvPr id="1" name=""/>
+        <p:cNvGrpSpPr/>
+        <p:nvPr/>
+      </p:nvGrpSpPr>
+      <p:grpSpPr>
+        <a:xfrm>
+          <a:off x="0" y="0"/>
+          <a:ext cx="0" cy="0"/>
+          <a:chOff x="0" y="0"/>
+          <a:chExt cx="0" cy="0"/>
+        </a:xfrm>
+      </p:grpSpPr>
+      <p:sp>
+        <p:nvSpPr>
+          <p:cNvPr id="2" name="Title 1">
+            <a:extLst>
+              <a:ext uri="{FF2B5EF4-FFF2-40B4-BE49-F238E27FC236}">
+                <a16:creationId xmlns:a16="http://schemas.microsoft.com/office/drawing/2014/main" id="{58246D7D-AFDC-4C93-9F29-84EE7A0F1493}"/>
+              </a:ext>
+            </a:extLst>
+          </p:cNvPr>
+          <p:cNvSpPr>
+            <a:spLocks noGrp="1"/>
+          </p:cNvSpPr>
+          <p:nvPr>
+            <p:ph type="ctrTitle"/>
+          </p:nvPr>
+        </p:nvSpPr>
+        <p:spPr/>
+        <p:txBody>
+          <a:bodyPr>
+            <a:normAutofit/>
+          </a:bodyPr>
+          <a:lstStyle/>
+          <a:p>
+            <a:r>
+              <a:rPr lang="en-US" sz="4800" dirty="0"/>
+              <a:t>Time Series Project</a:t>
+            </a:r>
+          </a:p>
+        </p:txBody>
+      </p:sp>
+      <p:sp>
+        <p:nvSpPr>
+          <p:cNvPr id="3" name="Subtitle 2">
+            <a:extLst>
+              <a:ext uri="{FF2B5EF4-FFF2-40B4-BE49-F238E27FC236}">
+                <a16:creationId xmlns:a16="http://schemas.microsoft.com/office/drawing/2014/main" id="{53F0EF33-604E-452A-B4A4-4D9EA7037CD1}"/>
+              </a:ext>
+            </a:extLst>
+          </p:cNvPr>
+          <p:cNvSpPr>
+            <a:spLocks noGrp="1"/>
+          </p:cNvSpPr>
+          <p:nvPr>
+            <p:ph type="subTitle" idx="1"/>
+          </p:nvPr>
+        </p:nvSpPr>
+        <p:spPr/>
+        <p:txBody>
+          <a:bodyPr/>
+          <a:lstStyle/>
+          <a:p>
+            <a:r>
+              <a:rPr lang="en-US" dirty="0"/>
+              <a:t>Cameron Stewart &amp; Ana Elsa Glaser</a:t>
+            </a:r>
+          </a:p>
+        </p:txBody>
+      </p:sp>
+    </p:spTree>
+    <p:extLst>
+      <p:ext uri="{BB962C8B-B14F-4D97-AF65-F5344CB8AC3E}">
+        <p14:creationId xmlns:p14="http://schemas.microsoft.com/office/powerpoint/2010/main" val="211404212"/>
+      </p:ext>
+    </p:extLst>
+  </p:cSld>
+  <p:clrMapOvr>
+    <a:masterClrMapping/>
+  </p:clrMapOvr>
+</p:sld>
+</file>
+
+<file path=ppt/slides/slide10.xml><?xml version="1.0" encoding="utf-8"?>
 <p:sld xmlns:a="http://schemas.openxmlformats.org/drawingml/2006/main" xmlns:r="http://schemas.openxmlformats.org/officeDocument/2006/relationships" xmlns:p="http://schemas.openxmlformats.org/presentationml/2006/main">
   <p:cSld>
     <p:spTree>
@@ -3779,7 +3875,7 @@
           <p:cNvPr id="2" name="Title 1">
             <a:extLst>
               <a:ext uri="{FF2B5EF4-FFF2-40B4-BE49-F238E27FC236}">
-                <a16:creationId xmlns:a16="http://schemas.microsoft.com/office/drawing/2014/main" id="{58246D7D-AFDC-4C93-9F29-84EE7A0F1493}"/>
+                <a16:creationId xmlns:a16="http://schemas.microsoft.com/office/drawing/2014/main" id="{050DFEC9-9950-4B36-B118-A1B45FB18E9E}"/>
               </a:ext>
             </a:extLst>
           </p:cNvPr>
@@ -3787,10 +3883,15 @@
             <a:spLocks noGrp="1"/>
           </p:cNvSpPr>
           <p:nvPr>
-            <p:ph type="ctrTitle"/>
-          </p:nvPr>
-        </p:nvSpPr>
-        <p:spPr/>
+            <p:ph type="title"/>
+          </p:nvPr>
+        </p:nvSpPr>
+        <p:spPr>
+          <a:xfrm>
+            <a:off x="0" y="-1"/>
+            <a:ext cx="10972800" cy="1194955"/>
+          </a:xfrm>
+        </p:spPr>
         <p:txBody>
           <a:bodyPr>
             <a:normAutofit/>
@@ -3798,44 +3899,125 @@
           <a:lstStyle/>
           <a:p>
             <a:r>
-              <a:rPr lang="en-US" sz="4800" dirty="0"/>
-              <a:t>Time Series Project</a:t>
-            </a:r>
-          </a:p>
-        </p:txBody>
-      </p:sp>
-      <p:sp>
-        <p:nvSpPr>
-          <p:cNvPr id="3" name="Subtitle 2">
+              <a:rPr lang="en-US" dirty="0"/>
+              <a:t>RW RMSE ARIMA(21,0,8) with s = 7</a:t>
+            </a:r>
+          </a:p>
+        </p:txBody>
+      </p:sp>
+      <p:sp>
+        <p:nvSpPr>
+          <p:cNvPr id="12" name="TextBox 11">
             <a:extLst>
               <a:ext uri="{FF2B5EF4-FFF2-40B4-BE49-F238E27FC236}">
-                <a16:creationId xmlns:a16="http://schemas.microsoft.com/office/drawing/2014/main" id="{53F0EF33-604E-452A-B4A4-4D9EA7037CD1}"/>
+                <a16:creationId xmlns:a16="http://schemas.microsoft.com/office/drawing/2014/main" id="{AFC3E635-80A0-064C-9EAE-3F04979C7F92}"/>
               </a:ext>
             </a:extLst>
           </p:cNvPr>
-          <p:cNvSpPr>
-            <a:spLocks noGrp="1"/>
-          </p:cNvSpPr>
-          <p:nvPr>
-            <p:ph type="subTitle" idx="1"/>
-          </p:nvPr>
-        </p:nvSpPr>
-        <p:spPr/>
-        <p:txBody>
-          <a:bodyPr/>
-          <a:lstStyle/>
-          <a:p>
-            <a:r>
-              <a:rPr lang="en-US" dirty="0"/>
-              <a:t>Cameron Stewart &amp; Ana Elsa Glaser</a:t>
-            </a:r>
-          </a:p>
-        </p:txBody>
-      </p:sp>
+          <p:cNvSpPr txBox="1"/>
+          <p:nvPr/>
+        </p:nvSpPr>
+        <p:spPr>
+          <a:xfrm>
+            <a:off x="6431973" y="2959580"/>
+            <a:ext cx="4204997" cy="1477328"/>
+          </a:xfrm>
+          <a:prstGeom prst="rect">
+            <a:avLst/>
+          </a:prstGeom>
+          <a:noFill/>
+        </p:spPr>
+        <p:txBody>
+          <a:bodyPr wrap="none" rtlCol="0">
+            <a:spAutoFit/>
+          </a:bodyPr>
+          <a:lstStyle/>
+          <a:p>
+            <a:pPr marL="285750" indent="-285750">
+              <a:buFont typeface="Arial" panose="020B0604020202020204" pitchFamily="34" charset="0"/>
+              <a:buChar char="•"/>
+            </a:pPr>
+            <a:r>
+              <a:rPr lang="en-US" dirty="0"/>
+              <a:t>Rolling Window RMSE:</a:t>
+            </a:r>
+          </a:p>
+          <a:p>
+            <a:pPr marL="742950" lvl="1" indent="-285750">
+              <a:buFont typeface="Arial" panose="020B0604020202020204" pitchFamily="34" charset="0"/>
+              <a:buChar char="•"/>
+            </a:pPr>
+            <a:r>
+              <a:rPr lang="en-US" dirty="0"/>
+              <a:t>Short Term Forecast – 7 Days</a:t>
+            </a:r>
+          </a:p>
+          <a:p>
+            <a:pPr marL="1200150" lvl="2" indent="-285750">
+              <a:buFont typeface="Arial" panose="020B0604020202020204" pitchFamily="34" charset="0"/>
+              <a:buChar char="•"/>
+            </a:pPr>
+            <a:r>
+              <a:rPr lang="en-US" dirty="0"/>
+              <a:t>3457 Cases</a:t>
+            </a:r>
+          </a:p>
+          <a:p>
+            <a:pPr marL="742950" lvl="1" indent="-285750">
+              <a:buFont typeface="Arial" panose="020B0604020202020204" pitchFamily="34" charset="0"/>
+              <a:buChar char="•"/>
+            </a:pPr>
+            <a:r>
+              <a:rPr lang="en-US" dirty="0"/>
+              <a:t>Long Term Forecast – 21 Days</a:t>
+            </a:r>
+          </a:p>
+          <a:p>
+            <a:pPr marL="1200150" lvl="2" indent="-285750">
+              <a:buFont typeface="Arial" panose="020B0604020202020204" pitchFamily="34" charset="0"/>
+              <a:buChar char="•"/>
+            </a:pPr>
+            <a:r>
+              <a:rPr lang="en-US" dirty="0"/>
+              <a:t>4271 Cases</a:t>
+            </a:r>
+          </a:p>
+        </p:txBody>
+      </p:sp>
+      <p:pic>
+        <p:nvPicPr>
+          <p:cNvPr id="10" name="Picture 9">
+            <a:extLst>
+              <a:ext uri="{FF2B5EF4-FFF2-40B4-BE49-F238E27FC236}">
+                <a16:creationId xmlns:a16="http://schemas.microsoft.com/office/drawing/2014/main" id="{2F8C5FBA-EDEE-BB45-AE9D-9CEF4062E6F2}"/>
+              </a:ext>
+            </a:extLst>
+          </p:cNvPr>
+          <p:cNvPicPr>
+            <a:picLocks noChangeAspect="1"/>
+          </p:cNvPicPr>
+          <p:nvPr/>
+        </p:nvPicPr>
+        <p:blipFill>
+          <a:blip r:embed="rId2"/>
+          <a:stretch>
+            <a:fillRect/>
+          </a:stretch>
+        </p:blipFill>
+        <p:spPr>
+          <a:xfrm>
+            <a:off x="0" y="1551710"/>
+            <a:ext cx="6096000" cy="4195628"/>
+          </a:xfrm>
+          <a:prstGeom prst="rect">
+            <a:avLst/>
+          </a:prstGeom>
+        </p:spPr>
+      </p:pic>
     </p:spTree>
     <p:extLst>
       <p:ext uri="{BB962C8B-B14F-4D97-AF65-F5344CB8AC3E}">
-        <p14:creationId xmlns:p14="http://schemas.microsoft.com/office/powerpoint/2010/main" val="211404212"/>
+        <p14:creationId xmlns:p14="http://schemas.microsoft.com/office/powerpoint/2010/main" val="440156600"/>
       </p:ext>
     </p:extLst>
   </p:cSld>
@@ -3845,7 +4027,7 @@
 </p:sld>
 </file>
 
-<file path=ppt/slides/slide2.xml><?xml version="1.0" encoding="utf-8"?>
+<file path=ppt/slides/slide11.xml><?xml version="1.0" encoding="utf-8"?>
 <p:sld xmlns:a="http://schemas.openxmlformats.org/drawingml/2006/main" xmlns:r="http://schemas.openxmlformats.org/officeDocument/2006/relationships" xmlns:p="http://schemas.openxmlformats.org/presentationml/2006/main">
   <p:cSld>
     <p:spTree>
@@ -3867,6 +4049,861 @@
           <p:cNvPr id="2" name="Title 1">
             <a:extLst>
               <a:ext uri="{FF2B5EF4-FFF2-40B4-BE49-F238E27FC236}">
+                <a16:creationId xmlns:a16="http://schemas.microsoft.com/office/drawing/2014/main" id="{050DFEC9-9950-4B36-B118-A1B45FB18E9E}"/>
+              </a:ext>
+            </a:extLst>
+          </p:cNvPr>
+          <p:cNvSpPr>
+            <a:spLocks noGrp="1"/>
+          </p:cNvSpPr>
+          <p:nvPr>
+            <p:ph type="title"/>
+          </p:nvPr>
+        </p:nvSpPr>
+        <p:spPr>
+          <a:xfrm>
+            <a:off x="0" y="-1"/>
+            <a:ext cx="9043988" cy="1194955"/>
+          </a:xfrm>
+        </p:spPr>
+        <p:txBody>
+          <a:bodyPr>
+            <a:normAutofit/>
+          </a:bodyPr>
+          <a:lstStyle/>
+          <a:p>
+            <a:r>
+              <a:rPr lang="en-US" dirty="0"/>
+              <a:t>Identify Differencing Model</a:t>
+            </a:r>
+          </a:p>
+        </p:txBody>
+      </p:sp>
+      <p:sp>
+        <p:nvSpPr>
+          <p:cNvPr id="8" name="TextBox 7">
+            <a:extLst>
+              <a:ext uri="{FF2B5EF4-FFF2-40B4-BE49-F238E27FC236}">
+                <a16:creationId xmlns:a16="http://schemas.microsoft.com/office/drawing/2014/main" id="{F3C39332-A0FC-E744-AED3-49CF40294CC1}"/>
+              </a:ext>
+            </a:extLst>
+          </p:cNvPr>
+          <p:cNvSpPr txBox="1"/>
+          <p:nvPr/>
+        </p:nvSpPr>
+        <p:spPr>
+          <a:xfrm>
+            <a:off x="1453980" y="2428006"/>
+            <a:ext cx="2193229" cy="369332"/>
+          </a:xfrm>
+          <a:prstGeom prst="rect">
+            <a:avLst/>
+          </a:prstGeom>
+          <a:noFill/>
+        </p:spPr>
+        <p:txBody>
+          <a:bodyPr wrap="none" rtlCol="0">
+            <a:spAutoFit/>
+          </a:bodyPr>
+          <a:lstStyle/>
+          <a:p>
+            <a:r>
+              <a:rPr lang="en-US" dirty="0"/>
+              <a:t>Remove (1-B) term</a:t>
+            </a:r>
+          </a:p>
+        </p:txBody>
+      </p:sp>
+      <p:pic>
+        <p:nvPicPr>
+          <p:cNvPr id="3" name="Picture 2">
+            <a:extLst>
+              <a:ext uri="{FF2B5EF4-FFF2-40B4-BE49-F238E27FC236}">
+                <a16:creationId xmlns:a16="http://schemas.microsoft.com/office/drawing/2014/main" id="{FD9ADCD6-5178-774A-82D6-D70F040416C7}"/>
+              </a:ext>
+            </a:extLst>
+          </p:cNvPr>
+          <p:cNvPicPr>
+            <a:picLocks noChangeAspect="1"/>
+          </p:cNvPicPr>
+          <p:nvPr/>
+        </p:nvPicPr>
+        <p:blipFill>
+          <a:blip r:embed="rId2"/>
+          <a:stretch>
+            <a:fillRect/>
+          </a:stretch>
+        </p:blipFill>
+        <p:spPr>
+          <a:xfrm>
+            <a:off x="4042064" y="1447368"/>
+            <a:ext cx="7200899" cy="2471086"/>
+          </a:xfrm>
+          <a:prstGeom prst="rect">
+            <a:avLst/>
+          </a:prstGeom>
+        </p:spPr>
+      </p:pic>
+      <p:pic>
+        <p:nvPicPr>
+          <p:cNvPr id="4" name="Picture 3">
+            <a:extLst>
+              <a:ext uri="{FF2B5EF4-FFF2-40B4-BE49-F238E27FC236}">
+                <a16:creationId xmlns:a16="http://schemas.microsoft.com/office/drawing/2014/main" id="{A8094909-3666-A84B-B1B2-1901D84AFFDF}"/>
+              </a:ext>
+            </a:extLst>
+          </p:cNvPr>
+          <p:cNvPicPr>
+            <a:picLocks noChangeAspect="1"/>
+          </p:cNvPicPr>
+          <p:nvPr/>
+        </p:nvPicPr>
+        <p:blipFill>
+          <a:blip r:embed="rId3"/>
+          <a:stretch>
+            <a:fillRect/>
+          </a:stretch>
+        </p:blipFill>
+        <p:spPr>
+          <a:xfrm>
+            <a:off x="114300" y="4030391"/>
+            <a:ext cx="3532909" cy="2035517"/>
+          </a:xfrm>
+          <a:prstGeom prst="rect">
+            <a:avLst/>
+          </a:prstGeom>
+        </p:spPr>
+      </p:pic>
+      <p:pic>
+        <p:nvPicPr>
+          <p:cNvPr id="6" name="Picture 5">
+            <a:extLst>
+              <a:ext uri="{FF2B5EF4-FFF2-40B4-BE49-F238E27FC236}">
+                <a16:creationId xmlns:a16="http://schemas.microsoft.com/office/drawing/2014/main" id="{CCCFB804-9A03-7F43-95BD-6BC2A7671C66}"/>
+              </a:ext>
+            </a:extLst>
+          </p:cNvPr>
+          <p:cNvPicPr>
+            <a:picLocks noChangeAspect="1"/>
+          </p:cNvPicPr>
+          <p:nvPr/>
+        </p:nvPicPr>
+        <p:blipFill>
+          <a:blip r:embed="rId4"/>
+          <a:stretch>
+            <a:fillRect/>
+          </a:stretch>
+        </p:blipFill>
+        <p:spPr>
+          <a:xfrm>
+            <a:off x="4042063" y="3918454"/>
+            <a:ext cx="7200900" cy="2503400"/>
+          </a:xfrm>
+          <a:prstGeom prst="rect">
+            <a:avLst/>
+          </a:prstGeom>
+        </p:spPr>
+      </p:pic>
+    </p:spTree>
+    <p:extLst>
+      <p:ext uri="{BB962C8B-B14F-4D97-AF65-F5344CB8AC3E}">
+        <p14:creationId xmlns:p14="http://schemas.microsoft.com/office/powerpoint/2010/main" val="2964750471"/>
+      </p:ext>
+    </p:extLst>
+  </p:cSld>
+  <p:clrMapOvr>
+    <a:masterClrMapping/>
+  </p:clrMapOvr>
+</p:sld>
+</file>
+
+<file path=ppt/slides/slide12.xml><?xml version="1.0" encoding="utf-8"?>
+<p:sld xmlns:a="http://schemas.openxmlformats.org/drawingml/2006/main" xmlns:r="http://schemas.openxmlformats.org/officeDocument/2006/relationships" xmlns:p="http://schemas.openxmlformats.org/presentationml/2006/main">
+  <p:cSld>
+    <p:spTree>
+      <p:nvGrpSpPr>
+        <p:cNvPr id="1" name=""/>
+        <p:cNvGrpSpPr/>
+        <p:nvPr/>
+      </p:nvGrpSpPr>
+      <p:grpSpPr>
+        <a:xfrm>
+          <a:off x="0" y="0"/>
+          <a:ext cx="0" cy="0"/>
+          <a:chOff x="0" y="0"/>
+          <a:chExt cx="0" cy="0"/>
+        </a:xfrm>
+      </p:grpSpPr>
+      <p:sp>
+        <p:nvSpPr>
+          <p:cNvPr id="2" name="Title 1">
+            <a:extLst>
+              <a:ext uri="{FF2B5EF4-FFF2-40B4-BE49-F238E27FC236}">
+                <a16:creationId xmlns:a16="http://schemas.microsoft.com/office/drawing/2014/main" id="{050DFEC9-9950-4B36-B118-A1B45FB18E9E}"/>
+              </a:ext>
+            </a:extLst>
+          </p:cNvPr>
+          <p:cNvSpPr>
+            <a:spLocks noGrp="1"/>
+          </p:cNvSpPr>
+          <p:nvPr>
+            <p:ph type="title"/>
+          </p:nvPr>
+        </p:nvSpPr>
+        <p:spPr>
+          <a:xfrm>
+            <a:off x="0" y="-1"/>
+            <a:ext cx="9043988" cy="1194955"/>
+          </a:xfrm>
+        </p:spPr>
+        <p:txBody>
+          <a:bodyPr>
+            <a:normAutofit/>
+          </a:bodyPr>
+          <a:lstStyle/>
+          <a:p>
+            <a:r>
+              <a:rPr lang="en-US" dirty="0"/>
+              <a:t>RW RMSE ARIMA(6,1,14)</a:t>
+            </a:r>
+          </a:p>
+        </p:txBody>
+      </p:sp>
+      <p:sp>
+        <p:nvSpPr>
+          <p:cNvPr id="8" name="TextBox 7">
+            <a:extLst>
+              <a:ext uri="{FF2B5EF4-FFF2-40B4-BE49-F238E27FC236}">
+                <a16:creationId xmlns:a16="http://schemas.microsoft.com/office/drawing/2014/main" id="{1A6D050D-9BD7-0D48-9DA1-F491B1359034}"/>
+              </a:ext>
+            </a:extLst>
+          </p:cNvPr>
+          <p:cNvSpPr txBox="1"/>
+          <p:nvPr/>
+        </p:nvSpPr>
+        <p:spPr>
+          <a:xfrm>
+            <a:off x="6224155" y="2690336"/>
+            <a:ext cx="4204997" cy="1477328"/>
+          </a:xfrm>
+          <a:prstGeom prst="rect">
+            <a:avLst/>
+          </a:prstGeom>
+          <a:noFill/>
+        </p:spPr>
+        <p:txBody>
+          <a:bodyPr wrap="none" rtlCol="0">
+            <a:spAutoFit/>
+          </a:bodyPr>
+          <a:lstStyle/>
+          <a:p>
+            <a:pPr marL="285750" indent="-285750">
+              <a:buFont typeface="Arial" panose="020B0604020202020204" pitchFamily="34" charset="0"/>
+              <a:buChar char="•"/>
+            </a:pPr>
+            <a:r>
+              <a:rPr lang="en-US" dirty="0"/>
+              <a:t>Rolling Window RMSE:</a:t>
+            </a:r>
+          </a:p>
+          <a:p>
+            <a:pPr marL="742950" lvl="1" indent="-285750">
+              <a:buFont typeface="Arial" panose="020B0604020202020204" pitchFamily="34" charset="0"/>
+              <a:buChar char="•"/>
+            </a:pPr>
+            <a:r>
+              <a:rPr lang="en-US" dirty="0"/>
+              <a:t>Short Term Forecast – 7 Days</a:t>
+            </a:r>
+          </a:p>
+          <a:p>
+            <a:pPr marL="1200150" lvl="2" indent="-285750">
+              <a:buFont typeface="Arial" panose="020B0604020202020204" pitchFamily="34" charset="0"/>
+              <a:buChar char="•"/>
+            </a:pPr>
+            <a:r>
+              <a:rPr lang="en-US" dirty="0"/>
+              <a:t>2981 Cases</a:t>
+            </a:r>
+          </a:p>
+          <a:p>
+            <a:pPr marL="742950" lvl="1" indent="-285750">
+              <a:buFont typeface="Arial" panose="020B0604020202020204" pitchFamily="34" charset="0"/>
+              <a:buChar char="•"/>
+            </a:pPr>
+            <a:r>
+              <a:rPr lang="en-US" dirty="0"/>
+              <a:t>Long Term Forecast – 21 Days</a:t>
+            </a:r>
+          </a:p>
+          <a:p>
+            <a:pPr marL="1200150" lvl="2" indent="-285750">
+              <a:buFont typeface="Arial" panose="020B0604020202020204" pitchFamily="34" charset="0"/>
+              <a:buChar char="•"/>
+            </a:pPr>
+            <a:r>
+              <a:rPr lang="en-US" dirty="0"/>
+              <a:t>3806 Cases</a:t>
+            </a:r>
+          </a:p>
+        </p:txBody>
+      </p:sp>
+      <p:pic>
+        <p:nvPicPr>
+          <p:cNvPr id="9" name="Picture 8">
+            <a:extLst>
+              <a:ext uri="{FF2B5EF4-FFF2-40B4-BE49-F238E27FC236}">
+                <a16:creationId xmlns:a16="http://schemas.microsoft.com/office/drawing/2014/main" id="{CC2DFF8A-76B4-8D4C-8135-77CB233D972F}"/>
+              </a:ext>
+            </a:extLst>
+          </p:cNvPr>
+          <p:cNvPicPr>
+            <a:picLocks noChangeAspect="1"/>
+          </p:cNvPicPr>
+          <p:nvPr/>
+        </p:nvPicPr>
+        <p:blipFill>
+          <a:blip r:embed="rId2"/>
+          <a:stretch>
+            <a:fillRect/>
+          </a:stretch>
+        </p:blipFill>
+        <p:spPr>
+          <a:xfrm>
+            <a:off x="-1" y="1669378"/>
+            <a:ext cx="5963961" cy="4118357"/>
+          </a:xfrm>
+          <a:prstGeom prst="rect">
+            <a:avLst/>
+          </a:prstGeom>
+        </p:spPr>
+      </p:pic>
+      <p:sp>
+        <p:nvSpPr>
+          <p:cNvPr id="10" name="TextBox 9">
+            <a:extLst>
+              <a:ext uri="{FF2B5EF4-FFF2-40B4-BE49-F238E27FC236}">
+                <a16:creationId xmlns:a16="http://schemas.microsoft.com/office/drawing/2014/main" id="{554476BB-8A1B-E94D-B77C-BF180B567F8A}"/>
+              </a:ext>
+            </a:extLst>
+          </p:cNvPr>
+          <p:cNvSpPr txBox="1"/>
+          <p:nvPr/>
+        </p:nvSpPr>
+        <p:spPr>
+          <a:xfrm>
+            <a:off x="7387936" y="4675909"/>
+            <a:ext cx="2536272" cy="369332"/>
+          </a:xfrm>
+          <a:prstGeom prst="rect">
+            <a:avLst/>
+          </a:prstGeom>
+          <a:noFill/>
+        </p:spPr>
+        <p:txBody>
+          <a:bodyPr wrap="none" rtlCol="0">
+            <a:spAutoFit/>
+          </a:bodyPr>
+          <a:lstStyle/>
+          <a:p>
+            <a:r>
+              <a:rPr lang="en-US" dirty="0"/>
+              <a:t>BOTH ARE LOWER!!</a:t>
+            </a:r>
+          </a:p>
+        </p:txBody>
+      </p:sp>
+    </p:spTree>
+    <p:extLst>
+      <p:ext uri="{BB962C8B-B14F-4D97-AF65-F5344CB8AC3E}">
+        <p14:creationId xmlns:p14="http://schemas.microsoft.com/office/powerpoint/2010/main" val="136190045"/>
+      </p:ext>
+    </p:extLst>
+  </p:cSld>
+  <p:clrMapOvr>
+    <a:masterClrMapping/>
+  </p:clrMapOvr>
+</p:sld>
+</file>
+
+<file path=ppt/slides/slide13.xml><?xml version="1.0" encoding="utf-8"?>
+<p:sld xmlns:a="http://schemas.openxmlformats.org/drawingml/2006/main" xmlns:r="http://schemas.openxmlformats.org/officeDocument/2006/relationships" xmlns:p="http://schemas.openxmlformats.org/presentationml/2006/main">
+  <p:cSld>
+    <p:spTree>
+      <p:nvGrpSpPr>
+        <p:cNvPr id="1" name=""/>
+        <p:cNvGrpSpPr/>
+        <p:nvPr/>
+      </p:nvGrpSpPr>
+      <p:grpSpPr>
+        <a:xfrm>
+          <a:off x="0" y="0"/>
+          <a:ext cx="0" cy="0"/>
+          <a:chOff x="0" y="0"/>
+          <a:chExt cx="0" cy="0"/>
+        </a:xfrm>
+      </p:grpSpPr>
+      <p:sp>
+        <p:nvSpPr>
+          <p:cNvPr id="2" name="Title 1">
+            <a:extLst>
+              <a:ext uri="{FF2B5EF4-FFF2-40B4-BE49-F238E27FC236}">
+                <a16:creationId xmlns:a16="http://schemas.microsoft.com/office/drawing/2014/main" id="{050DFEC9-9950-4B36-B118-A1B45FB18E9E}"/>
+              </a:ext>
+            </a:extLst>
+          </p:cNvPr>
+          <p:cNvSpPr>
+            <a:spLocks noGrp="1"/>
+          </p:cNvSpPr>
+          <p:nvPr>
+            <p:ph type="title"/>
+          </p:nvPr>
+        </p:nvSpPr>
+        <p:spPr>
+          <a:xfrm>
+            <a:off x="0" y="0"/>
+            <a:ext cx="9043988" cy="777240"/>
+          </a:xfrm>
+        </p:spPr>
+        <p:txBody>
+          <a:bodyPr>
+            <a:normAutofit fontScale="90000"/>
+          </a:bodyPr>
+          <a:lstStyle/>
+          <a:p>
+            <a:r>
+              <a:rPr lang="en-US"/>
+              <a:t>Compare Randomly Generated Plots</a:t>
+            </a:r>
+            <a:endParaRPr lang="en-US" dirty="0"/>
+          </a:p>
+        </p:txBody>
+      </p:sp>
+      <p:pic>
+        <p:nvPicPr>
+          <p:cNvPr id="4" name="Picture 3">
+            <a:extLst>
+              <a:ext uri="{FF2B5EF4-FFF2-40B4-BE49-F238E27FC236}">
+                <a16:creationId xmlns:a16="http://schemas.microsoft.com/office/drawing/2014/main" id="{CE5744A7-2E1B-7B44-8267-0B7D030A04A4}"/>
+              </a:ext>
+            </a:extLst>
+          </p:cNvPr>
+          <p:cNvPicPr>
+            <a:picLocks noChangeAspect="1"/>
+          </p:cNvPicPr>
+          <p:nvPr/>
+        </p:nvPicPr>
+        <p:blipFill>
+          <a:blip r:embed="rId2"/>
+          <a:stretch>
+            <a:fillRect/>
+          </a:stretch>
+        </p:blipFill>
+        <p:spPr>
+          <a:xfrm>
+            <a:off x="2874168" y="737630"/>
+            <a:ext cx="6443663" cy="2160009"/>
+          </a:xfrm>
+          <a:prstGeom prst="rect">
+            <a:avLst/>
+          </a:prstGeom>
+        </p:spPr>
+      </p:pic>
+      <p:sp>
+        <p:nvSpPr>
+          <p:cNvPr id="7" name="TextBox 6">
+            <a:extLst>
+              <a:ext uri="{FF2B5EF4-FFF2-40B4-BE49-F238E27FC236}">
+                <a16:creationId xmlns:a16="http://schemas.microsoft.com/office/drawing/2014/main" id="{11295C64-BF37-9843-BFDD-352DC9831A20}"/>
+              </a:ext>
+            </a:extLst>
+          </p:cNvPr>
+          <p:cNvSpPr txBox="1"/>
+          <p:nvPr/>
+        </p:nvSpPr>
+        <p:spPr>
+          <a:xfrm>
+            <a:off x="257175" y="1457325"/>
+            <a:ext cx="2351926" cy="369332"/>
+          </a:xfrm>
+          <a:prstGeom prst="rect">
+            <a:avLst/>
+          </a:prstGeom>
+          <a:noFill/>
+        </p:spPr>
+        <p:txBody>
+          <a:bodyPr wrap="none" rtlCol="0">
+            <a:spAutoFit/>
+          </a:bodyPr>
+          <a:lstStyle/>
+          <a:p>
+            <a:r>
+              <a:rPr lang="en-US" dirty="0"/>
+              <a:t>Original Realization</a:t>
+            </a:r>
+          </a:p>
+        </p:txBody>
+      </p:sp>
+      <p:sp>
+        <p:nvSpPr>
+          <p:cNvPr id="13" name="TextBox 12">
+            <a:extLst>
+              <a:ext uri="{FF2B5EF4-FFF2-40B4-BE49-F238E27FC236}">
+                <a16:creationId xmlns:a16="http://schemas.microsoft.com/office/drawing/2014/main" id="{0BE389B6-F55B-AF42-B754-52586B128986}"/>
+              </a:ext>
+            </a:extLst>
+          </p:cNvPr>
+          <p:cNvSpPr txBox="1"/>
+          <p:nvPr/>
+        </p:nvSpPr>
+        <p:spPr>
+          <a:xfrm>
+            <a:off x="257175" y="3472990"/>
+            <a:ext cx="1792478" cy="646331"/>
+          </a:xfrm>
+          <a:prstGeom prst="rect">
+            <a:avLst/>
+          </a:prstGeom>
+          <a:noFill/>
+        </p:spPr>
+        <p:txBody>
+          <a:bodyPr wrap="none" rtlCol="0">
+            <a:spAutoFit/>
+          </a:bodyPr>
+          <a:lstStyle/>
+          <a:p>
+            <a:r>
+              <a:rPr lang="en-US" dirty="0"/>
+              <a:t>ARIMA(21,0,8)</a:t>
+            </a:r>
+          </a:p>
+          <a:p>
+            <a:r>
+              <a:rPr lang="en-US" dirty="0"/>
+              <a:t>with s = 7</a:t>
+            </a:r>
+          </a:p>
+        </p:txBody>
+      </p:sp>
+      <p:sp>
+        <p:nvSpPr>
+          <p:cNvPr id="15" name="TextBox 14">
+            <a:extLst>
+              <a:ext uri="{FF2B5EF4-FFF2-40B4-BE49-F238E27FC236}">
+                <a16:creationId xmlns:a16="http://schemas.microsoft.com/office/drawing/2014/main" id="{264494C9-E36E-704F-9CEE-B58953EDF19C}"/>
+              </a:ext>
+            </a:extLst>
+          </p:cNvPr>
+          <p:cNvSpPr txBox="1"/>
+          <p:nvPr/>
+        </p:nvSpPr>
+        <p:spPr>
+          <a:xfrm>
+            <a:off x="257175" y="5400675"/>
+            <a:ext cx="1792478" cy="369332"/>
+          </a:xfrm>
+          <a:prstGeom prst="rect">
+            <a:avLst/>
+          </a:prstGeom>
+          <a:noFill/>
+        </p:spPr>
+        <p:txBody>
+          <a:bodyPr wrap="none" rtlCol="0">
+            <a:spAutoFit/>
+          </a:bodyPr>
+          <a:lstStyle/>
+          <a:p>
+            <a:r>
+              <a:rPr lang="en-US" dirty="0"/>
+              <a:t>ARIMA(6,1,14)</a:t>
+            </a:r>
+          </a:p>
+        </p:txBody>
+      </p:sp>
+      <p:pic>
+        <p:nvPicPr>
+          <p:cNvPr id="3" name="Picture 2">
+            <a:extLst>
+              <a:ext uri="{FF2B5EF4-FFF2-40B4-BE49-F238E27FC236}">
+                <a16:creationId xmlns:a16="http://schemas.microsoft.com/office/drawing/2014/main" id="{E0641656-DFC1-FC4E-99AB-84A5723B6597}"/>
+              </a:ext>
+            </a:extLst>
+          </p:cNvPr>
+          <p:cNvPicPr>
+            <a:picLocks noChangeAspect="1"/>
+          </p:cNvPicPr>
+          <p:nvPr/>
+        </p:nvPicPr>
+        <p:blipFill>
+          <a:blip r:embed="rId3"/>
+          <a:stretch>
+            <a:fillRect/>
+          </a:stretch>
+        </p:blipFill>
+        <p:spPr>
+          <a:xfrm>
+            <a:off x="2874168" y="2776377"/>
+            <a:ext cx="6443663" cy="2184292"/>
+          </a:xfrm>
+          <a:prstGeom prst="rect">
+            <a:avLst/>
+          </a:prstGeom>
+        </p:spPr>
+      </p:pic>
+      <p:pic>
+        <p:nvPicPr>
+          <p:cNvPr id="6" name="Picture 5">
+            <a:extLst>
+              <a:ext uri="{FF2B5EF4-FFF2-40B4-BE49-F238E27FC236}">
+                <a16:creationId xmlns:a16="http://schemas.microsoft.com/office/drawing/2014/main" id="{219D45FD-1BEA-DF4A-99DB-9391FAE7EED2}"/>
+              </a:ext>
+            </a:extLst>
+          </p:cNvPr>
+          <p:cNvPicPr>
+            <a:picLocks noChangeAspect="1"/>
+          </p:cNvPicPr>
+          <p:nvPr/>
+        </p:nvPicPr>
+        <p:blipFill rotWithShape="1">
+          <a:blip r:embed="rId4"/>
+          <a:srcRect b="6785"/>
+          <a:stretch/>
+        </p:blipFill>
+        <p:spPr>
+          <a:xfrm>
+            <a:off x="2874168" y="4839987"/>
+            <a:ext cx="6443663" cy="2018013"/>
+          </a:xfrm>
+          <a:prstGeom prst="rect">
+            <a:avLst/>
+          </a:prstGeom>
+        </p:spPr>
+      </p:pic>
+    </p:spTree>
+    <p:extLst>
+      <p:ext uri="{BB962C8B-B14F-4D97-AF65-F5344CB8AC3E}">
+        <p14:creationId xmlns:p14="http://schemas.microsoft.com/office/powerpoint/2010/main" val="2782303367"/>
+      </p:ext>
+    </p:extLst>
+  </p:cSld>
+  <p:clrMapOvr>
+    <a:masterClrMapping/>
+  </p:clrMapOvr>
+</p:sld>
+</file>
+
+<file path=ppt/slides/slide14.xml><?xml version="1.0" encoding="utf-8"?>
+<p:sld xmlns:a="http://schemas.openxmlformats.org/drawingml/2006/main" xmlns:r="http://schemas.openxmlformats.org/officeDocument/2006/relationships" xmlns:p="http://schemas.openxmlformats.org/presentationml/2006/main">
+  <p:cSld>
+    <p:spTree>
+      <p:nvGrpSpPr>
+        <p:cNvPr id="1" name=""/>
+        <p:cNvGrpSpPr/>
+        <p:nvPr/>
+      </p:nvGrpSpPr>
+      <p:grpSpPr>
+        <a:xfrm>
+          <a:off x="0" y="0"/>
+          <a:ext cx="0" cy="0"/>
+          <a:chOff x="0" y="0"/>
+          <a:chExt cx="0" cy="0"/>
+        </a:xfrm>
+      </p:grpSpPr>
+      <p:sp>
+        <p:nvSpPr>
+          <p:cNvPr id="2" name="Title 1">
+            <a:extLst>
+              <a:ext uri="{FF2B5EF4-FFF2-40B4-BE49-F238E27FC236}">
+                <a16:creationId xmlns:a16="http://schemas.microsoft.com/office/drawing/2014/main" id="{8E3C6B26-4A29-49E7-B2F3-CA4FFF8D61F4}"/>
+              </a:ext>
+            </a:extLst>
+          </p:cNvPr>
+          <p:cNvSpPr>
+            <a:spLocks noGrp="1"/>
+          </p:cNvSpPr>
+          <p:nvPr>
+            <p:ph type="title"/>
+          </p:nvPr>
+        </p:nvSpPr>
+        <p:spPr/>
+        <p:txBody>
+          <a:bodyPr/>
+          <a:lstStyle/>
+          <a:p>
+            <a:r>
+              <a:rPr lang="en-US" dirty="0"/>
+              <a:t>Strategy for the rest of the analysis</a:t>
+            </a:r>
+          </a:p>
+        </p:txBody>
+      </p:sp>
+      <p:sp>
+        <p:nvSpPr>
+          <p:cNvPr id="3" name="Content Placeholder 2">
+            <a:extLst>
+              <a:ext uri="{FF2B5EF4-FFF2-40B4-BE49-F238E27FC236}">
+                <a16:creationId xmlns:a16="http://schemas.microsoft.com/office/drawing/2014/main" id="{AC92AF72-4F34-4A62-A945-98EB2A6B34C2}"/>
+              </a:ext>
+            </a:extLst>
+          </p:cNvPr>
+          <p:cNvSpPr>
+            <a:spLocks noGrp="1"/>
+          </p:cNvSpPr>
+          <p:nvPr>
+            <p:ph idx="1"/>
+          </p:nvPr>
+        </p:nvSpPr>
+        <p:spPr/>
+        <p:txBody>
+          <a:bodyPr/>
+          <a:lstStyle/>
+          <a:p>
+            <a:r>
+              <a:rPr lang="en-US" dirty="0"/>
+              <a:t>Investigate models with regressors such as:</a:t>
+            </a:r>
+          </a:p>
+          <a:p>
+            <a:pPr lvl="1"/>
+            <a:r>
+              <a:rPr lang="en-US" dirty="0"/>
+              <a:t>Google Mobility Data</a:t>
+            </a:r>
+          </a:p>
+          <a:p>
+            <a:pPr lvl="1"/>
+            <a:r>
+              <a:rPr lang="en-US" dirty="0"/>
+              <a:t>Vaccination Doses</a:t>
+            </a:r>
+          </a:p>
+          <a:p>
+            <a:pPr lvl="1"/>
+            <a:r>
+              <a:rPr lang="en-US" dirty="0"/>
+              <a:t>Covid Tests Taken</a:t>
+            </a:r>
+          </a:p>
+          <a:p>
+            <a:r>
+              <a:rPr lang="en-US" dirty="0"/>
+              <a:t>Investigate using models such as:</a:t>
+            </a:r>
+          </a:p>
+          <a:p>
+            <a:pPr lvl="1"/>
+            <a:r>
+              <a:rPr lang="en-US" dirty="0"/>
+              <a:t>Vector AR Models</a:t>
+            </a:r>
+          </a:p>
+          <a:p>
+            <a:pPr lvl="1"/>
+            <a:r>
+              <a:rPr lang="en-US" dirty="0"/>
+              <a:t>Neural Network Models</a:t>
+            </a:r>
+          </a:p>
+        </p:txBody>
+      </p:sp>
+    </p:spTree>
+    <p:extLst>
+      <p:ext uri="{BB962C8B-B14F-4D97-AF65-F5344CB8AC3E}">
+        <p14:creationId xmlns:p14="http://schemas.microsoft.com/office/powerpoint/2010/main" val="1301189734"/>
+      </p:ext>
+    </p:extLst>
+  </p:cSld>
+  <p:clrMapOvr>
+    <a:masterClrMapping/>
+  </p:clrMapOvr>
+</p:sld>
+</file>
+
+<file path=ppt/slides/slide15.xml><?xml version="1.0" encoding="utf-8"?>
+<p:sld xmlns:a="http://schemas.openxmlformats.org/drawingml/2006/main" xmlns:r="http://schemas.openxmlformats.org/officeDocument/2006/relationships" xmlns:p="http://schemas.openxmlformats.org/presentationml/2006/main">
+  <p:cSld>
+    <p:spTree>
+      <p:nvGrpSpPr>
+        <p:cNvPr id="1" name=""/>
+        <p:cNvGrpSpPr/>
+        <p:nvPr/>
+      </p:nvGrpSpPr>
+      <p:grpSpPr>
+        <a:xfrm>
+          <a:off x="0" y="0"/>
+          <a:ext cx="0" cy="0"/>
+          <a:chOff x="0" y="0"/>
+          <a:chExt cx="0" cy="0"/>
+        </a:xfrm>
+      </p:grpSpPr>
+      <p:sp>
+        <p:nvSpPr>
+          <p:cNvPr id="2" name="Title 1">
+            <a:extLst>
+              <a:ext uri="{FF2B5EF4-FFF2-40B4-BE49-F238E27FC236}">
+                <a16:creationId xmlns:a16="http://schemas.microsoft.com/office/drawing/2014/main" id="{8E3C6B26-4A29-49E7-B2F3-CA4FFF8D61F4}"/>
+              </a:ext>
+            </a:extLst>
+          </p:cNvPr>
+          <p:cNvSpPr>
+            <a:spLocks noGrp="1"/>
+          </p:cNvSpPr>
+          <p:nvPr>
+            <p:ph type="title"/>
+          </p:nvPr>
+        </p:nvSpPr>
+        <p:spPr>
+          <a:xfrm>
+            <a:off x="3412790" y="2256904"/>
+            <a:ext cx="3912801" cy="1359131"/>
+          </a:xfrm>
+        </p:spPr>
+        <p:txBody>
+          <a:bodyPr/>
+          <a:lstStyle/>
+          <a:p>
+            <a:r>
+              <a:rPr lang="en-US" dirty="0"/>
+              <a:t>THANK YOU!</a:t>
+            </a:r>
+          </a:p>
+        </p:txBody>
+      </p:sp>
+    </p:spTree>
+    <p:extLst>
+      <p:ext uri="{BB962C8B-B14F-4D97-AF65-F5344CB8AC3E}">
+        <p14:creationId xmlns:p14="http://schemas.microsoft.com/office/powerpoint/2010/main" val="2805972506"/>
+      </p:ext>
+    </p:extLst>
+  </p:cSld>
+  <p:clrMapOvr>
+    <a:masterClrMapping/>
+  </p:clrMapOvr>
+</p:sld>
+</file>
+
+<file path=ppt/slides/slide2.xml><?xml version="1.0" encoding="utf-8"?>
+<p:sld xmlns:a="http://schemas.openxmlformats.org/drawingml/2006/main" xmlns:r="http://schemas.openxmlformats.org/officeDocument/2006/relationships" xmlns:p="http://schemas.openxmlformats.org/presentationml/2006/main" show="0">
+  <p:cSld>
+    <p:spTree>
+      <p:nvGrpSpPr>
+        <p:cNvPr id="1" name=""/>
+        <p:cNvGrpSpPr/>
+        <p:nvPr/>
+      </p:nvGrpSpPr>
+      <p:grpSpPr>
+        <a:xfrm>
+          <a:off x="0" y="0"/>
+          <a:ext cx="0" cy="0"/>
+          <a:chOff x="0" y="0"/>
+          <a:chExt cx="0" cy="0"/>
+        </a:xfrm>
+      </p:grpSpPr>
+      <p:sp>
+        <p:nvSpPr>
+          <p:cNvPr id="2" name="Title 1">
+            <a:extLst>
+              <a:ext uri="{FF2B5EF4-FFF2-40B4-BE49-F238E27FC236}">
                 <a16:creationId xmlns:a16="http://schemas.microsoft.com/office/drawing/2014/main" id="{2F6D6540-36B3-467D-9F49-1FA11276631F}"/>
               </a:ext>
             </a:extLst>
@@ -4105,7 +5142,7 @@
 </file>
 
 <file path=ppt/slides/slide3.xml><?xml version="1.0" encoding="utf-8"?>
-<p:sld xmlns:a="http://schemas.openxmlformats.org/drawingml/2006/main" xmlns:r="http://schemas.openxmlformats.org/officeDocument/2006/relationships" xmlns:p="http://schemas.openxmlformats.org/presentationml/2006/main">
+<p:sld xmlns:a="http://schemas.openxmlformats.org/drawingml/2006/main" xmlns:r="http://schemas.openxmlformats.org/officeDocument/2006/relationships" xmlns:p="http://schemas.openxmlformats.org/presentationml/2006/main" show="0">
   <p:cSld>
     <p:spTree>
       <p:nvGrpSpPr>
@@ -4318,7 +5355,7 @@
 </file>
 
 <file path=ppt/slides/slide4.xml><?xml version="1.0" encoding="utf-8"?>
-<p:sld xmlns:a="http://schemas.openxmlformats.org/drawingml/2006/main" xmlns:r="http://schemas.openxmlformats.org/officeDocument/2006/relationships" xmlns:p="http://schemas.openxmlformats.org/presentationml/2006/main">
+<p:sld xmlns:a="http://schemas.openxmlformats.org/drawingml/2006/main" xmlns:r="http://schemas.openxmlformats.org/officeDocument/2006/relationships" xmlns:p="http://schemas.openxmlformats.org/presentationml/2006/main" show="0">
   <p:cSld>
     <p:spTree>
       <p:nvGrpSpPr>
@@ -4549,7 +5586,7 @@
 </file>
 
 <file path=ppt/slides/slide5.xml><?xml version="1.0" encoding="utf-8"?>
-<p:sld xmlns:a="http://schemas.openxmlformats.org/drawingml/2006/main" xmlns:r="http://schemas.openxmlformats.org/officeDocument/2006/relationships" xmlns:p="http://schemas.openxmlformats.org/presentationml/2006/main">
+<p:sld xmlns:a="http://schemas.openxmlformats.org/drawingml/2006/main" xmlns:r="http://schemas.openxmlformats.org/officeDocument/2006/relationships" xmlns:p="http://schemas.openxmlformats.org/presentationml/2006/main" show="0">
   <p:cSld>
     <p:spTree>
       <p:nvGrpSpPr>
@@ -4637,7 +5674,7 @@
 </file>
 
 <file path=ppt/slides/slide6.xml><?xml version="1.0" encoding="utf-8"?>
-<p:sld xmlns:a="http://schemas.openxmlformats.org/drawingml/2006/main" xmlns:r="http://schemas.openxmlformats.org/officeDocument/2006/relationships" xmlns:p="http://schemas.openxmlformats.org/presentationml/2006/main">
+<p:sld xmlns:a="http://schemas.openxmlformats.org/drawingml/2006/main" xmlns:r="http://schemas.openxmlformats.org/officeDocument/2006/relationships" xmlns:p="http://schemas.openxmlformats.org/presentationml/2006/main" show="0">
   <p:cSld>
     <p:spTree>
       <p:nvGrpSpPr>
@@ -4746,7 +5783,7 @@
           <p:cNvPr id="2" name="Title 1">
             <a:extLst>
               <a:ext uri="{FF2B5EF4-FFF2-40B4-BE49-F238E27FC236}">
-                <a16:creationId xmlns:a16="http://schemas.microsoft.com/office/drawing/2014/main" id="{8E3C6B26-4A29-49E7-B2F3-CA4FFF8D61F4}"/>
+                <a16:creationId xmlns:a16="http://schemas.microsoft.com/office/drawing/2014/main" id="{050DFEC9-9950-4B36-B118-A1B45FB18E9E}"/>
               </a:ext>
             </a:extLst>
           </p:cNvPr>
@@ -4757,47 +5794,476 @@
             <p:ph type="title"/>
           </p:nvPr>
         </p:nvSpPr>
-        <p:spPr/>
-        <p:txBody>
-          <a:bodyPr/>
-          <a:lstStyle/>
-          <a:p>
-            <a:r>
-              <a:rPr lang="en-US" dirty="0"/>
-              <a:t>Strategy for the rest of the analysis</a:t>
-            </a:r>
-          </a:p>
-        </p:txBody>
-      </p:sp>
-      <p:sp>
-        <p:nvSpPr>
-          <p:cNvPr id="3" name="Content Placeholder 2">
+        <p:spPr>
+          <a:xfrm>
+            <a:off x="0" y="-1"/>
+            <a:ext cx="10972800" cy="1194955"/>
+          </a:xfrm>
+        </p:spPr>
+        <p:txBody>
+          <a:bodyPr>
+            <a:normAutofit/>
+          </a:bodyPr>
+          <a:lstStyle/>
+          <a:p>
+            <a:r>
+              <a:rPr lang="en-US" dirty="0"/>
+              <a:t>My Sources</a:t>
+            </a:r>
+          </a:p>
+        </p:txBody>
+      </p:sp>
+      <p:sp>
+        <p:nvSpPr>
+          <p:cNvPr id="4" name="TextBox 3">
             <a:extLst>
               <a:ext uri="{FF2B5EF4-FFF2-40B4-BE49-F238E27FC236}">
-                <a16:creationId xmlns:a16="http://schemas.microsoft.com/office/drawing/2014/main" id="{AC92AF72-4F34-4A62-A945-98EB2A6B34C2}"/>
+                <a16:creationId xmlns:a16="http://schemas.microsoft.com/office/drawing/2014/main" id="{3E1D1432-5565-F240-9614-FB5BA9C175E3}"/>
               </a:ext>
             </a:extLst>
           </p:cNvPr>
-          <p:cNvSpPr>
-            <a:spLocks noGrp="1"/>
-          </p:cNvSpPr>
-          <p:nvPr>
-            <p:ph idx="1"/>
-          </p:nvPr>
-        </p:nvSpPr>
-        <p:spPr/>
-        <p:txBody>
-          <a:bodyPr/>
-          <a:lstStyle/>
-          <a:p>
-            <a:endParaRPr lang="en-US"/>
+          <p:cNvSpPr txBox="1"/>
+          <p:nvPr/>
+        </p:nvSpPr>
+        <p:spPr>
+          <a:xfrm>
+            <a:off x="446809" y="1808018"/>
+            <a:ext cx="6933308" cy="2031325"/>
+          </a:xfrm>
+          <a:prstGeom prst="rect">
+            <a:avLst/>
+          </a:prstGeom>
+          <a:noFill/>
+        </p:spPr>
+        <p:txBody>
+          <a:bodyPr wrap="none" rtlCol="0">
+            <a:spAutoFit/>
+          </a:bodyPr>
+          <a:lstStyle/>
+          <a:p>
+            <a:r>
+              <a:rPr lang="en-US" b="1" dirty="0"/>
+              <a:t>Vaccine Information:</a:t>
+            </a:r>
+          </a:p>
+          <a:p>
+            <a:r>
+              <a:rPr lang="en-US" dirty="0"/>
+              <a:t>https://www.dshs.texas.gov/coronavirus/immunize/vaccine.aspx</a:t>
+            </a:r>
+          </a:p>
+          <a:p>
+            <a:endParaRPr lang="en-US" dirty="0"/>
+          </a:p>
+          <a:p>
+            <a:r>
+              <a:rPr lang="en-US" b="1" dirty="0"/>
+              <a:t>Testing Information:</a:t>
+            </a:r>
+          </a:p>
+          <a:p>
+            <a:r>
+              <a:rPr lang="en-US" dirty="0"/>
+              <a:t>https://www.dshs.texas.gov/coronavirus/testing.aspx</a:t>
+            </a:r>
+          </a:p>
+          <a:p>
+            <a:endParaRPr lang="en-US" dirty="0"/>
+          </a:p>
+          <a:p>
+            <a:endParaRPr lang="en-US" dirty="0"/>
           </a:p>
         </p:txBody>
       </p:sp>
     </p:spTree>
     <p:extLst>
       <p:ext uri="{BB962C8B-B14F-4D97-AF65-F5344CB8AC3E}">
-        <p14:creationId xmlns:p14="http://schemas.microsoft.com/office/powerpoint/2010/main" val="1301189734"/>
+        <p14:creationId xmlns:p14="http://schemas.microsoft.com/office/powerpoint/2010/main" val="3860700219"/>
+      </p:ext>
+    </p:extLst>
+  </p:cSld>
+  <p:clrMapOvr>
+    <a:masterClrMapping/>
+  </p:clrMapOvr>
+</p:sld>
+</file>
+
+<file path=ppt/slides/slide8.xml><?xml version="1.0" encoding="utf-8"?>
+<p:sld xmlns:a="http://schemas.openxmlformats.org/drawingml/2006/main" xmlns:r="http://schemas.openxmlformats.org/officeDocument/2006/relationships" xmlns:p="http://schemas.openxmlformats.org/presentationml/2006/main">
+  <p:cSld>
+    <p:spTree>
+      <p:nvGrpSpPr>
+        <p:cNvPr id="1" name=""/>
+        <p:cNvGrpSpPr/>
+        <p:nvPr/>
+      </p:nvGrpSpPr>
+      <p:grpSpPr>
+        <a:xfrm>
+          <a:off x="0" y="0"/>
+          <a:ext cx="0" cy="0"/>
+          <a:chOff x="0" y="0"/>
+          <a:chExt cx="0" cy="0"/>
+        </a:xfrm>
+      </p:grpSpPr>
+      <p:sp>
+        <p:nvSpPr>
+          <p:cNvPr id="2" name="Title 1">
+            <a:extLst>
+              <a:ext uri="{FF2B5EF4-FFF2-40B4-BE49-F238E27FC236}">
+                <a16:creationId xmlns:a16="http://schemas.microsoft.com/office/drawing/2014/main" id="{050DFEC9-9950-4B36-B118-A1B45FB18E9E}"/>
+              </a:ext>
+            </a:extLst>
+          </p:cNvPr>
+          <p:cNvSpPr>
+            <a:spLocks noGrp="1"/>
+          </p:cNvSpPr>
+          <p:nvPr>
+            <p:ph type="title"/>
+          </p:nvPr>
+        </p:nvSpPr>
+        <p:spPr>
+          <a:xfrm>
+            <a:off x="0" y="-1"/>
+            <a:ext cx="10972800" cy="1194955"/>
+          </a:xfrm>
+        </p:spPr>
+        <p:txBody>
+          <a:bodyPr>
+            <a:normAutofit/>
+          </a:bodyPr>
+          <a:lstStyle/>
+          <a:p>
+            <a:r>
+              <a:rPr lang="en-US" dirty="0"/>
+              <a:t>Is our data stationary?</a:t>
+            </a:r>
+          </a:p>
+        </p:txBody>
+      </p:sp>
+      <p:sp>
+        <p:nvSpPr>
+          <p:cNvPr id="12" name="TextBox 11">
+            <a:extLst>
+              <a:ext uri="{FF2B5EF4-FFF2-40B4-BE49-F238E27FC236}">
+                <a16:creationId xmlns:a16="http://schemas.microsoft.com/office/drawing/2014/main" id="{AFC3E635-80A0-064C-9EAE-3F04979C7F92}"/>
+              </a:ext>
+            </a:extLst>
+          </p:cNvPr>
+          <p:cNvSpPr txBox="1"/>
+          <p:nvPr/>
+        </p:nvSpPr>
+        <p:spPr>
+          <a:xfrm>
+            <a:off x="-5394" y="3994718"/>
+            <a:ext cx="5784487" cy="2800767"/>
+          </a:xfrm>
+          <a:prstGeom prst="rect">
+            <a:avLst/>
+          </a:prstGeom>
+          <a:noFill/>
+        </p:spPr>
+        <p:txBody>
+          <a:bodyPr wrap="square" rtlCol="0">
+            <a:spAutoFit/>
+          </a:bodyPr>
+          <a:lstStyle/>
+          <a:p>
+            <a:r>
+              <a:rPr lang="en-US" sz="1600" dirty="0"/>
+              <a:t>From the realization, we can see the data wanders without a constant mean. Therefore, the realization is not stationary. This is confirmed by the slowly dampening positive positive ACF values. Without an additional realization, we would be speculating on constant variance. It does appear the variance increases with the magnitude of cases. Constant autocorrelations appear to be met by similar first and second half ACFs. To account for the stationarity, we explored a differencing approach and seasonal approach. We confirmed a combination of these did not lead to an effective model using ASE.</a:t>
+            </a:r>
+          </a:p>
+        </p:txBody>
+      </p:sp>
+      <p:pic>
+        <p:nvPicPr>
+          <p:cNvPr id="3" name="Picture 2">
+            <a:extLst>
+              <a:ext uri="{FF2B5EF4-FFF2-40B4-BE49-F238E27FC236}">
+                <a16:creationId xmlns:a16="http://schemas.microsoft.com/office/drawing/2014/main" id="{050AC58D-BB7C-B045-82EA-CE4CB677FB45}"/>
+              </a:ext>
+            </a:extLst>
+          </p:cNvPr>
+          <p:cNvPicPr>
+            <a:picLocks noChangeAspect="1"/>
+          </p:cNvPicPr>
+          <p:nvPr/>
+        </p:nvPicPr>
+        <p:blipFill>
+          <a:blip r:embed="rId2"/>
+          <a:stretch>
+            <a:fillRect/>
+          </a:stretch>
+        </p:blipFill>
+        <p:spPr>
+          <a:xfrm>
+            <a:off x="1465118" y="1194954"/>
+            <a:ext cx="8042564" cy="2799764"/>
+          </a:xfrm>
+          <a:prstGeom prst="rect">
+            <a:avLst/>
+          </a:prstGeom>
+        </p:spPr>
+      </p:pic>
+      <p:sp>
+        <p:nvSpPr>
+          <p:cNvPr id="5" name="TextBox 4">
+            <a:extLst>
+              <a:ext uri="{FF2B5EF4-FFF2-40B4-BE49-F238E27FC236}">
+                <a16:creationId xmlns:a16="http://schemas.microsoft.com/office/drawing/2014/main" id="{2434BC78-0124-E248-8437-719B631EE9C3}"/>
+              </a:ext>
+            </a:extLst>
+          </p:cNvPr>
+          <p:cNvSpPr txBox="1"/>
+          <p:nvPr/>
+        </p:nvSpPr>
+        <p:spPr>
+          <a:xfrm>
+            <a:off x="7039821" y="4140191"/>
+            <a:ext cx="3187091" cy="369332"/>
+          </a:xfrm>
+          <a:prstGeom prst="rect">
+            <a:avLst/>
+          </a:prstGeom>
+          <a:noFill/>
+        </p:spPr>
+        <p:txBody>
+          <a:bodyPr wrap="none" rtlCol="0">
+            <a:spAutoFit/>
+          </a:bodyPr>
+          <a:lstStyle/>
+          <a:p>
+            <a:r>
+              <a:rPr lang="en-US" dirty="0"/>
+              <a:t>First and Second Half ACFs</a:t>
+            </a:r>
+          </a:p>
+        </p:txBody>
+      </p:sp>
+      <p:pic>
+        <p:nvPicPr>
+          <p:cNvPr id="6" name="Picture 5">
+            <a:extLst>
+              <a:ext uri="{FF2B5EF4-FFF2-40B4-BE49-F238E27FC236}">
+                <a16:creationId xmlns:a16="http://schemas.microsoft.com/office/drawing/2014/main" id="{6BED43AE-5988-7A40-A117-A36D4B52DB4E}"/>
+              </a:ext>
+            </a:extLst>
+          </p:cNvPr>
+          <p:cNvPicPr>
+            <a:picLocks noChangeAspect="1"/>
+          </p:cNvPicPr>
+          <p:nvPr/>
+        </p:nvPicPr>
+        <p:blipFill>
+          <a:blip r:embed="rId3"/>
+          <a:stretch>
+            <a:fillRect/>
+          </a:stretch>
+        </p:blipFill>
+        <p:spPr>
+          <a:xfrm>
+            <a:off x="6096000" y="4509523"/>
+            <a:ext cx="5074735" cy="1910730"/>
+          </a:xfrm>
+          <a:prstGeom prst="rect">
+            <a:avLst/>
+          </a:prstGeom>
+        </p:spPr>
+      </p:pic>
+    </p:spTree>
+    <p:extLst>
+      <p:ext uri="{BB962C8B-B14F-4D97-AF65-F5344CB8AC3E}">
+        <p14:creationId xmlns:p14="http://schemas.microsoft.com/office/powerpoint/2010/main" val="2492717752"/>
+      </p:ext>
+    </p:extLst>
+  </p:cSld>
+  <p:clrMapOvr>
+    <a:masterClrMapping/>
+  </p:clrMapOvr>
+</p:sld>
+</file>
+
+<file path=ppt/slides/slide9.xml><?xml version="1.0" encoding="utf-8"?>
+<p:sld xmlns:a="http://schemas.openxmlformats.org/drawingml/2006/main" xmlns:r="http://schemas.openxmlformats.org/officeDocument/2006/relationships" xmlns:p="http://schemas.openxmlformats.org/presentationml/2006/main">
+  <p:cSld>
+    <p:spTree>
+      <p:nvGrpSpPr>
+        <p:cNvPr id="1" name=""/>
+        <p:cNvGrpSpPr/>
+        <p:nvPr/>
+      </p:nvGrpSpPr>
+      <p:grpSpPr>
+        <a:xfrm>
+          <a:off x="0" y="0"/>
+          <a:ext cx="0" cy="0"/>
+          <a:chOff x="0" y="0"/>
+          <a:chExt cx="0" cy="0"/>
+        </a:xfrm>
+      </p:grpSpPr>
+      <p:sp>
+        <p:nvSpPr>
+          <p:cNvPr id="2" name="Title 1">
+            <a:extLst>
+              <a:ext uri="{FF2B5EF4-FFF2-40B4-BE49-F238E27FC236}">
+                <a16:creationId xmlns:a16="http://schemas.microsoft.com/office/drawing/2014/main" id="{050DFEC9-9950-4B36-B118-A1B45FB18E9E}"/>
+              </a:ext>
+            </a:extLst>
+          </p:cNvPr>
+          <p:cNvSpPr>
+            <a:spLocks noGrp="1"/>
+          </p:cNvSpPr>
+          <p:nvPr>
+            <p:ph type="title"/>
+          </p:nvPr>
+        </p:nvSpPr>
+        <p:spPr>
+          <a:xfrm>
+            <a:off x="0" y="-1"/>
+            <a:ext cx="9043988" cy="1194955"/>
+          </a:xfrm>
+        </p:spPr>
+        <p:txBody>
+          <a:bodyPr>
+            <a:normAutofit/>
+          </a:bodyPr>
+          <a:lstStyle/>
+          <a:p>
+            <a:r>
+              <a:rPr lang="en-US" dirty="0"/>
+              <a:t>Identify Seasonal Model</a:t>
+            </a:r>
+          </a:p>
+        </p:txBody>
+      </p:sp>
+      <p:sp>
+        <p:nvSpPr>
+          <p:cNvPr id="8" name="TextBox 7">
+            <a:extLst>
+              <a:ext uri="{FF2B5EF4-FFF2-40B4-BE49-F238E27FC236}">
+                <a16:creationId xmlns:a16="http://schemas.microsoft.com/office/drawing/2014/main" id="{F3C39332-A0FC-E744-AED3-49CF40294CC1}"/>
+              </a:ext>
+            </a:extLst>
+          </p:cNvPr>
+          <p:cNvSpPr txBox="1"/>
+          <p:nvPr/>
+        </p:nvSpPr>
+        <p:spPr>
+          <a:xfrm>
+            <a:off x="489916" y="2372038"/>
+            <a:ext cx="3381054" cy="369332"/>
+          </a:xfrm>
+          <a:prstGeom prst="rect">
+            <a:avLst/>
+          </a:prstGeom>
+          <a:noFill/>
+        </p:spPr>
+        <p:txBody>
+          <a:bodyPr wrap="none" rtlCol="0">
+            <a:spAutoFit/>
+          </a:bodyPr>
+          <a:lstStyle/>
+          <a:p>
+            <a:r>
+              <a:rPr lang="en-US" dirty="0"/>
+              <a:t>Remove Seasonality of 7 Days</a:t>
+            </a:r>
+          </a:p>
+        </p:txBody>
+      </p:sp>
+      <p:pic>
+        <p:nvPicPr>
+          <p:cNvPr id="9" name="Picture 8">
+            <a:extLst>
+              <a:ext uri="{FF2B5EF4-FFF2-40B4-BE49-F238E27FC236}">
+                <a16:creationId xmlns:a16="http://schemas.microsoft.com/office/drawing/2014/main" id="{B95ECBC1-90F0-9342-AC98-543CCED592DB}"/>
+              </a:ext>
+            </a:extLst>
+          </p:cNvPr>
+          <p:cNvPicPr>
+            <a:picLocks noChangeAspect="1"/>
+          </p:cNvPicPr>
+          <p:nvPr/>
+        </p:nvPicPr>
+        <p:blipFill>
+          <a:blip r:embed="rId2"/>
+          <a:stretch>
+            <a:fillRect/>
+          </a:stretch>
+        </p:blipFill>
+        <p:spPr>
+          <a:xfrm>
+            <a:off x="4042066" y="1308161"/>
+            <a:ext cx="7200899" cy="2497086"/>
+          </a:xfrm>
+          <a:prstGeom prst="rect">
+            <a:avLst/>
+          </a:prstGeom>
+        </p:spPr>
+      </p:pic>
+      <p:pic>
+        <p:nvPicPr>
+          <p:cNvPr id="11" name="Picture 10">
+            <a:extLst>
+              <a:ext uri="{FF2B5EF4-FFF2-40B4-BE49-F238E27FC236}">
+                <a16:creationId xmlns:a16="http://schemas.microsoft.com/office/drawing/2014/main" id="{BE9AD455-2C5C-0047-867F-1122C48C84FF}"/>
+              </a:ext>
+            </a:extLst>
+          </p:cNvPr>
+          <p:cNvPicPr>
+            <a:picLocks noChangeAspect="1"/>
+          </p:cNvPicPr>
+          <p:nvPr/>
+        </p:nvPicPr>
+        <p:blipFill>
+          <a:blip r:embed="rId3"/>
+          <a:stretch>
+            <a:fillRect/>
+          </a:stretch>
+        </p:blipFill>
+        <p:spPr>
+          <a:xfrm>
+            <a:off x="259773" y="4089231"/>
+            <a:ext cx="3505200" cy="2197100"/>
+          </a:xfrm>
+          <a:prstGeom prst="rect">
+            <a:avLst/>
+          </a:prstGeom>
+        </p:spPr>
+      </p:pic>
+      <p:pic>
+        <p:nvPicPr>
+          <p:cNvPr id="17" name="Picture 16">
+            <a:extLst>
+              <a:ext uri="{FF2B5EF4-FFF2-40B4-BE49-F238E27FC236}">
+                <a16:creationId xmlns:a16="http://schemas.microsoft.com/office/drawing/2014/main" id="{E06B59BF-3CAB-6D4F-885C-D643F60877D9}"/>
+              </a:ext>
+            </a:extLst>
+          </p:cNvPr>
+          <p:cNvPicPr>
+            <a:picLocks noChangeAspect="1"/>
+          </p:cNvPicPr>
+          <p:nvPr/>
+        </p:nvPicPr>
+        <p:blipFill>
+          <a:blip r:embed="rId4"/>
+          <a:stretch>
+            <a:fillRect/>
+          </a:stretch>
+        </p:blipFill>
+        <p:spPr>
+          <a:xfrm>
+            <a:off x="4042065" y="3918454"/>
+            <a:ext cx="7200899" cy="2538655"/>
+          </a:xfrm>
+          <a:prstGeom prst="rect">
+            <a:avLst/>
+          </a:prstGeom>
+        </p:spPr>
+      </p:pic>
+    </p:spTree>
+    <p:extLst>
+      <p:ext uri="{BB962C8B-B14F-4D97-AF65-F5344CB8AC3E}">
+        <p14:creationId xmlns:p14="http://schemas.microsoft.com/office/powerpoint/2010/main" val="1964254580"/>
       </p:ext>
     </p:extLst>
   </p:cSld>

</xml_diff>